<commit_message>
2016.08.16 - Presentation work
</commit_message>
<xml_diff>
--- a/Final_Presentation_CSalviati.pptx
+++ b/Final_Presentation_CSalviati.pptx
@@ -175,10 +175,10 @@
           </a:lstStyle>
           <a:p>
             <a:r>
-              <a:rPr lang="pt-BR" smtClean="0"/>
+              <a:rPr lang="pt-BR" dirty="0" smtClean="0"/>
               <a:t>DS-SF-24</a:t>
             </a:r>
-            <a:endParaRPr lang="en-US"/>
+            <a:endParaRPr lang="en-US" dirty="0"/>
           </a:p>
         </p:txBody>
       </p:sp>
@@ -213,7 +213,7 @@
               <a:rPr lang="en-US" smtClean="0"/>
               <a:t>8/14/16</a:t>
             </a:fld>
-            <a:endParaRPr lang="en-US"/>
+            <a:endParaRPr lang="en-US" dirty="0"/>
           </a:p>
         </p:txBody>
       </p:sp>
@@ -244,7 +244,7 @@
             </a:lvl1pPr>
           </a:lstStyle>
           <a:p>
-            <a:endParaRPr lang="en-US"/>
+            <a:endParaRPr lang="en-US" dirty="0"/>
           </a:p>
         </p:txBody>
       </p:sp>
@@ -279,7 +279,7 @@
               <a:rPr lang="en-US" smtClean="0"/>
               <a:t>‹#›</a:t>
             </a:fld>
-            <a:endParaRPr lang="en-US"/>
+            <a:endParaRPr lang="en-US" dirty="0"/>
           </a:p>
         </p:txBody>
       </p:sp>
@@ -345,10 +345,10 @@
           </a:lstStyle>
           <a:p>
             <a:r>
-              <a:rPr lang="pt-BR" smtClean="0"/>
+              <a:rPr lang="pt-BR" dirty="0" smtClean="0"/>
               <a:t>DS-SF-24</a:t>
             </a:r>
-            <a:endParaRPr lang="en-US"/>
+            <a:endParaRPr lang="en-US" dirty="0"/>
           </a:p>
         </p:txBody>
       </p:sp>
@@ -383,7 +383,7 @@
               <a:rPr lang="en-US" smtClean="0"/>
               <a:t>8/14/16</a:t>
             </a:fld>
-            <a:endParaRPr lang="en-US"/>
+            <a:endParaRPr lang="en-US" dirty="0"/>
           </a:p>
         </p:txBody>
       </p:sp>
@@ -416,7 +416,7 @@
           <a:bodyPr vert="horz" lIns="91440" tIns="45720" rIns="91440" bIns="45720" rtlCol="0" anchor="ctr"/>
           <a:lstStyle/>
           <a:p>
-            <a:endParaRPr lang="en-US"/>
+            <a:endParaRPr lang="en-US" dirty="0"/>
           </a:p>
         </p:txBody>
       </p:sp>
@@ -507,7 +507,7 @@
             </a:lvl1pPr>
           </a:lstStyle>
           <a:p>
-            <a:endParaRPr lang="en-US"/>
+            <a:endParaRPr lang="en-US" dirty="0"/>
           </a:p>
         </p:txBody>
       </p:sp>
@@ -542,7 +542,7 @@
               <a:rPr lang="en-US" smtClean="0"/>
               <a:t>‹#›</a:t>
             </a:fld>
-            <a:endParaRPr lang="en-US"/>
+            <a:endParaRPr lang="en-US" dirty="0"/>
           </a:p>
         </p:txBody>
       </p:sp>
@@ -694,7 +694,7 @@
           <a:bodyPr/>
           <a:lstStyle/>
           <a:p>
-            <a:endParaRPr lang="en-US"/>
+            <a:endParaRPr lang="en-US" dirty="0"/>
           </a:p>
         </p:txBody>
       </p:sp>
@@ -717,7 +717,7 @@
               <a:rPr lang="en-US" smtClean="0"/>
               <a:t>1</a:t>
             </a:fld>
-            <a:endParaRPr lang="en-US"/>
+            <a:endParaRPr lang="en-US" dirty="0"/>
           </a:p>
         </p:txBody>
       </p:sp>
@@ -737,10 +737,10 @@
           <a:lstStyle/>
           <a:p>
             <a:r>
-              <a:rPr lang="pt-BR" smtClean="0"/>
+              <a:rPr lang="pt-BR" dirty="0" smtClean="0"/>
               <a:t>DS-SF-24</a:t>
             </a:r>
-            <a:endParaRPr lang="en-US"/>
+            <a:endParaRPr lang="en-US" dirty="0"/>
           </a:p>
         </p:txBody>
       </p:sp>
@@ -801,7 +801,7 @@
           <a:bodyPr/>
           <a:lstStyle/>
           <a:p>
-            <a:endParaRPr lang="en-US"/>
+            <a:endParaRPr lang="en-US" dirty="0"/>
           </a:p>
         </p:txBody>
       </p:sp>
@@ -824,7 +824,7 @@
               <a:rPr lang="en-US" smtClean="0"/>
               <a:t>10</a:t>
             </a:fld>
-            <a:endParaRPr lang="en-US"/>
+            <a:endParaRPr lang="en-US" dirty="0"/>
           </a:p>
         </p:txBody>
       </p:sp>
@@ -844,10 +844,10 @@
           <a:lstStyle/>
           <a:p>
             <a:r>
-              <a:rPr lang="pt-BR" smtClean="0"/>
+              <a:rPr lang="pt-BR" dirty="0" smtClean="0"/>
               <a:t>DS-SF-24</a:t>
             </a:r>
-            <a:endParaRPr lang="en-US"/>
+            <a:endParaRPr lang="en-US" dirty="0"/>
           </a:p>
         </p:txBody>
       </p:sp>
@@ -908,7 +908,7 @@
           <a:bodyPr/>
           <a:lstStyle/>
           <a:p>
-            <a:endParaRPr lang="en-US"/>
+            <a:endParaRPr lang="en-US" dirty="0"/>
           </a:p>
         </p:txBody>
       </p:sp>
@@ -931,7 +931,7 @@
               <a:rPr lang="en-US" smtClean="0"/>
               <a:t>11</a:t>
             </a:fld>
-            <a:endParaRPr lang="en-US"/>
+            <a:endParaRPr lang="en-US" dirty="0"/>
           </a:p>
         </p:txBody>
       </p:sp>
@@ -951,10 +951,10 @@
           <a:lstStyle/>
           <a:p>
             <a:r>
-              <a:rPr lang="pt-BR" smtClean="0"/>
+              <a:rPr lang="pt-BR" dirty="0" smtClean="0"/>
               <a:t>DS-SF-24</a:t>
             </a:r>
-            <a:endParaRPr lang="en-US"/>
+            <a:endParaRPr lang="en-US" dirty="0"/>
           </a:p>
         </p:txBody>
       </p:sp>
@@ -1015,7 +1015,7 @@
           <a:bodyPr/>
           <a:lstStyle/>
           <a:p>
-            <a:endParaRPr lang="en-US"/>
+            <a:endParaRPr lang="en-US" dirty="0"/>
           </a:p>
         </p:txBody>
       </p:sp>
@@ -1038,7 +1038,7 @@
               <a:rPr lang="en-US" smtClean="0"/>
               <a:t>12</a:t>
             </a:fld>
-            <a:endParaRPr lang="en-US"/>
+            <a:endParaRPr lang="en-US" dirty="0"/>
           </a:p>
         </p:txBody>
       </p:sp>
@@ -1058,10 +1058,10 @@
           <a:lstStyle/>
           <a:p>
             <a:r>
-              <a:rPr lang="pt-BR" smtClean="0"/>
+              <a:rPr lang="pt-BR" dirty="0" smtClean="0"/>
               <a:t>DS-SF-24</a:t>
             </a:r>
-            <a:endParaRPr lang="en-US"/>
+            <a:endParaRPr lang="en-US" dirty="0"/>
           </a:p>
         </p:txBody>
       </p:sp>
@@ -1122,7 +1122,7 @@
           <a:bodyPr/>
           <a:lstStyle/>
           <a:p>
-            <a:endParaRPr lang="en-US"/>
+            <a:endParaRPr lang="en-US" dirty="0"/>
           </a:p>
         </p:txBody>
       </p:sp>
@@ -1145,7 +1145,7 @@
               <a:rPr lang="en-US" smtClean="0"/>
               <a:t>13</a:t>
             </a:fld>
-            <a:endParaRPr lang="en-US"/>
+            <a:endParaRPr lang="en-US" dirty="0"/>
           </a:p>
         </p:txBody>
       </p:sp>
@@ -1165,10 +1165,10 @@
           <a:lstStyle/>
           <a:p>
             <a:r>
-              <a:rPr lang="pt-BR" smtClean="0"/>
+              <a:rPr lang="pt-BR" dirty="0" smtClean="0"/>
               <a:t>DS-SF-24</a:t>
             </a:r>
-            <a:endParaRPr lang="en-US"/>
+            <a:endParaRPr lang="en-US" dirty="0"/>
           </a:p>
         </p:txBody>
       </p:sp>
@@ -1229,7 +1229,7 @@
           <a:bodyPr/>
           <a:lstStyle/>
           <a:p>
-            <a:endParaRPr lang="en-US"/>
+            <a:endParaRPr lang="en-US" dirty="0"/>
           </a:p>
         </p:txBody>
       </p:sp>
@@ -1252,7 +1252,7 @@
               <a:rPr lang="en-US" smtClean="0"/>
               <a:t>2</a:t>
             </a:fld>
-            <a:endParaRPr lang="en-US"/>
+            <a:endParaRPr lang="en-US" dirty="0"/>
           </a:p>
         </p:txBody>
       </p:sp>
@@ -1272,10 +1272,10 @@
           <a:lstStyle/>
           <a:p>
             <a:r>
-              <a:rPr lang="pt-BR" smtClean="0"/>
+              <a:rPr lang="pt-BR" dirty="0" smtClean="0"/>
               <a:t>DS-SF-24</a:t>
             </a:r>
-            <a:endParaRPr lang="en-US"/>
+            <a:endParaRPr lang="en-US" dirty="0"/>
           </a:p>
         </p:txBody>
       </p:sp>
@@ -1336,7 +1336,7 @@
           <a:bodyPr/>
           <a:lstStyle/>
           <a:p>
-            <a:endParaRPr lang="en-US"/>
+            <a:endParaRPr lang="en-US" dirty="0"/>
           </a:p>
         </p:txBody>
       </p:sp>
@@ -1359,7 +1359,7 @@
               <a:rPr lang="en-US" smtClean="0"/>
               <a:t>3</a:t>
             </a:fld>
-            <a:endParaRPr lang="en-US"/>
+            <a:endParaRPr lang="en-US" dirty="0"/>
           </a:p>
         </p:txBody>
       </p:sp>
@@ -1379,10 +1379,10 @@
           <a:lstStyle/>
           <a:p>
             <a:r>
-              <a:rPr lang="pt-BR" smtClean="0"/>
+              <a:rPr lang="pt-BR" dirty="0" smtClean="0"/>
               <a:t>DS-SF-24</a:t>
             </a:r>
-            <a:endParaRPr lang="en-US"/>
+            <a:endParaRPr lang="en-US" dirty="0"/>
           </a:p>
         </p:txBody>
       </p:sp>
@@ -1443,7 +1443,7 @@
           <a:bodyPr/>
           <a:lstStyle/>
           <a:p>
-            <a:endParaRPr lang="en-US"/>
+            <a:endParaRPr lang="en-US" dirty="0"/>
           </a:p>
         </p:txBody>
       </p:sp>
@@ -1466,7 +1466,7 @@
               <a:rPr lang="en-US" smtClean="0"/>
               <a:t>4</a:t>
             </a:fld>
-            <a:endParaRPr lang="en-US"/>
+            <a:endParaRPr lang="en-US" dirty="0"/>
           </a:p>
         </p:txBody>
       </p:sp>
@@ -1486,17 +1486,17 @@
           <a:lstStyle/>
           <a:p>
             <a:r>
-              <a:rPr lang="pt-BR" smtClean="0"/>
+              <a:rPr lang="pt-BR" dirty="0" smtClean="0"/>
               <a:t>DS-SF-24</a:t>
             </a:r>
-            <a:endParaRPr lang="en-US"/>
+            <a:endParaRPr lang="en-US" dirty="0"/>
           </a:p>
         </p:txBody>
       </p:sp>
     </p:spTree>
     <p:extLst>
       <p:ext uri="{BB962C8B-B14F-4D97-AF65-F5344CB8AC3E}">
-        <p14:creationId xmlns:p14="http://schemas.microsoft.com/office/powerpoint/2010/main" val="317719834"/>
+        <p14:creationId xmlns:p14="http://schemas.microsoft.com/office/powerpoint/2010/main" val="786210310"/>
       </p:ext>
     </p:extLst>
   </p:cSld>
@@ -1550,7 +1550,7 @@
           <a:bodyPr/>
           <a:lstStyle/>
           <a:p>
-            <a:endParaRPr lang="en-US"/>
+            <a:endParaRPr lang="en-US" dirty="0"/>
           </a:p>
         </p:txBody>
       </p:sp>
@@ -1573,7 +1573,7 @@
               <a:rPr lang="en-US" smtClean="0"/>
               <a:t>5</a:t>
             </a:fld>
-            <a:endParaRPr lang="en-US"/>
+            <a:endParaRPr lang="en-US" dirty="0"/>
           </a:p>
         </p:txBody>
       </p:sp>
@@ -1593,10 +1593,10 @@
           <a:lstStyle/>
           <a:p>
             <a:r>
-              <a:rPr lang="pt-BR" smtClean="0"/>
+              <a:rPr lang="pt-BR" dirty="0" smtClean="0"/>
               <a:t>DS-SF-24</a:t>
             </a:r>
-            <a:endParaRPr lang="en-US"/>
+            <a:endParaRPr lang="en-US" dirty="0"/>
           </a:p>
         </p:txBody>
       </p:sp>
@@ -1657,7 +1657,7 @@
           <a:bodyPr/>
           <a:lstStyle/>
           <a:p>
-            <a:endParaRPr lang="en-US"/>
+            <a:endParaRPr lang="en-US" dirty="0"/>
           </a:p>
         </p:txBody>
       </p:sp>
@@ -1680,7 +1680,7 @@
               <a:rPr lang="en-US" smtClean="0"/>
               <a:t>6</a:t>
             </a:fld>
-            <a:endParaRPr lang="en-US"/>
+            <a:endParaRPr lang="en-US" dirty="0"/>
           </a:p>
         </p:txBody>
       </p:sp>
@@ -1700,10 +1700,10 @@
           <a:lstStyle/>
           <a:p>
             <a:r>
-              <a:rPr lang="pt-BR" smtClean="0"/>
+              <a:rPr lang="pt-BR" dirty="0" smtClean="0"/>
               <a:t>DS-SF-24</a:t>
             </a:r>
-            <a:endParaRPr lang="en-US"/>
+            <a:endParaRPr lang="en-US" dirty="0"/>
           </a:p>
         </p:txBody>
       </p:sp>
@@ -1764,7 +1764,7 @@
           <a:bodyPr/>
           <a:lstStyle/>
           <a:p>
-            <a:endParaRPr lang="en-US"/>
+            <a:endParaRPr lang="en-US" dirty="0"/>
           </a:p>
         </p:txBody>
       </p:sp>
@@ -1787,7 +1787,7 @@
               <a:rPr lang="en-US" smtClean="0"/>
               <a:t>7</a:t>
             </a:fld>
-            <a:endParaRPr lang="en-US"/>
+            <a:endParaRPr lang="en-US" dirty="0"/>
           </a:p>
         </p:txBody>
       </p:sp>
@@ -1807,10 +1807,10 @@
           <a:lstStyle/>
           <a:p>
             <a:r>
-              <a:rPr lang="pt-BR" smtClean="0"/>
+              <a:rPr lang="pt-BR" dirty="0" smtClean="0"/>
               <a:t>DS-SF-24</a:t>
             </a:r>
-            <a:endParaRPr lang="en-US"/>
+            <a:endParaRPr lang="en-US" dirty="0"/>
           </a:p>
         </p:txBody>
       </p:sp>
@@ -1871,7 +1871,7 @@
           <a:bodyPr/>
           <a:lstStyle/>
           <a:p>
-            <a:endParaRPr lang="en-US"/>
+            <a:endParaRPr lang="en-US" dirty="0"/>
           </a:p>
         </p:txBody>
       </p:sp>
@@ -1894,7 +1894,7 @@
               <a:rPr lang="en-US" smtClean="0"/>
               <a:t>8</a:t>
             </a:fld>
-            <a:endParaRPr lang="en-US"/>
+            <a:endParaRPr lang="en-US" dirty="0"/>
           </a:p>
         </p:txBody>
       </p:sp>
@@ -1914,10 +1914,10 @@
           <a:lstStyle/>
           <a:p>
             <a:r>
-              <a:rPr lang="pt-BR" smtClean="0"/>
+              <a:rPr lang="pt-BR" dirty="0" smtClean="0"/>
               <a:t>DS-SF-24</a:t>
             </a:r>
-            <a:endParaRPr lang="en-US"/>
+            <a:endParaRPr lang="en-US" dirty="0"/>
           </a:p>
         </p:txBody>
       </p:sp>
@@ -1978,7 +1978,7 @@
           <a:bodyPr/>
           <a:lstStyle/>
           <a:p>
-            <a:endParaRPr lang="en-US"/>
+            <a:endParaRPr lang="en-US" dirty="0"/>
           </a:p>
         </p:txBody>
       </p:sp>
@@ -2001,7 +2001,7 @@
               <a:rPr lang="en-US" smtClean="0"/>
               <a:t>9</a:t>
             </a:fld>
-            <a:endParaRPr lang="en-US"/>
+            <a:endParaRPr lang="en-US" dirty="0"/>
           </a:p>
         </p:txBody>
       </p:sp>
@@ -2021,10 +2021,10 @@
           <a:lstStyle/>
           <a:p>
             <a:r>
-              <a:rPr lang="pt-BR" smtClean="0"/>
+              <a:rPr lang="pt-BR" dirty="0" smtClean="0"/>
               <a:t>DS-SF-24</a:t>
             </a:r>
-            <a:endParaRPr lang="en-US"/>
+            <a:endParaRPr lang="en-US" dirty="0"/>
           </a:p>
         </p:txBody>
       </p:sp>
@@ -2171,10 +2171,10 @@
           <a:lstStyle/>
           <a:p>
             <a:r>
-              <a:rPr lang="en-US" smtClean="0"/>
+              <a:rPr lang="en-US" dirty="0" smtClean="0"/>
               <a:t>8/18/16</a:t>
             </a:r>
-            <a:endParaRPr lang="en-US"/>
+            <a:endParaRPr lang="en-US" dirty="0"/>
           </a:p>
         </p:txBody>
       </p:sp>
@@ -2194,10 +2194,10 @@
           <a:lstStyle/>
           <a:p>
             <a:r>
-              <a:rPr lang="en-US" smtClean="0"/>
+              <a:rPr lang="en-US" dirty="0" smtClean="0"/>
               <a:t>&amp;[Page]</a:t>
             </a:r>
-            <a:endParaRPr lang="en-US"/>
+            <a:endParaRPr lang="en-US" dirty="0"/>
           </a:p>
         </p:txBody>
       </p:sp>
@@ -2220,7 +2220,7 @@
               <a:rPr lang="en-US" smtClean="0"/>
               <a:t>‹#›</a:t>
             </a:fld>
-            <a:endParaRPr lang="en-US"/>
+            <a:endParaRPr lang="en-US" dirty="0"/>
           </a:p>
         </p:txBody>
       </p:sp>
@@ -2345,10 +2345,10 @@
           <a:lstStyle/>
           <a:p>
             <a:r>
-              <a:rPr lang="en-US" smtClean="0"/>
+              <a:rPr lang="en-US" dirty="0" smtClean="0"/>
               <a:t>8/18/16</a:t>
             </a:r>
-            <a:endParaRPr lang="en-US"/>
+            <a:endParaRPr lang="en-US" dirty="0"/>
           </a:p>
         </p:txBody>
       </p:sp>
@@ -2368,10 +2368,10 @@
           <a:lstStyle/>
           <a:p>
             <a:r>
-              <a:rPr lang="en-US" smtClean="0"/>
+              <a:rPr lang="en-US" dirty="0" smtClean="0"/>
               <a:t>&amp;[Page]</a:t>
             </a:r>
-            <a:endParaRPr lang="en-US"/>
+            <a:endParaRPr lang="en-US" dirty="0"/>
           </a:p>
         </p:txBody>
       </p:sp>
@@ -2394,7 +2394,7 @@
               <a:rPr lang="en-US" smtClean="0"/>
               <a:t>‹#›</a:t>
             </a:fld>
-            <a:endParaRPr lang="en-US"/>
+            <a:endParaRPr lang="en-US" dirty="0"/>
           </a:p>
         </p:txBody>
       </p:sp>
@@ -2529,10 +2529,10 @@
           <a:lstStyle/>
           <a:p>
             <a:r>
-              <a:rPr lang="en-US" smtClean="0"/>
+              <a:rPr lang="en-US" dirty="0" smtClean="0"/>
               <a:t>8/18/16</a:t>
             </a:r>
-            <a:endParaRPr lang="en-US"/>
+            <a:endParaRPr lang="en-US" dirty="0"/>
           </a:p>
         </p:txBody>
       </p:sp>
@@ -2552,10 +2552,10 @@
           <a:lstStyle/>
           <a:p>
             <a:r>
-              <a:rPr lang="en-US" smtClean="0"/>
+              <a:rPr lang="en-US" dirty="0" smtClean="0"/>
               <a:t>&amp;[Page]</a:t>
             </a:r>
-            <a:endParaRPr lang="en-US"/>
+            <a:endParaRPr lang="en-US" dirty="0"/>
           </a:p>
         </p:txBody>
       </p:sp>
@@ -2578,7 +2578,7 @@
               <a:rPr lang="en-US" smtClean="0"/>
               <a:t>‹#›</a:t>
             </a:fld>
-            <a:endParaRPr lang="en-US"/>
+            <a:endParaRPr lang="en-US" dirty="0"/>
           </a:p>
         </p:txBody>
       </p:sp>
@@ -2703,10 +2703,10 @@
           <a:lstStyle/>
           <a:p>
             <a:r>
-              <a:rPr lang="en-US" smtClean="0"/>
+              <a:rPr lang="en-US" dirty="0" smtClean="0"/>
               <a:t>8/18/16</a:t>
             </a:r>
-            <a:endParaRPr lang="en-US"/>
+            <a:endParaRPr lang="en-US" dirty="0"/>
           </a:p>
         </p:txBody>
       </p:sp>
@@ -2726,10 +2726,10 @@
           <a:lstStyle/>
           <a:p>
             <a:r>
-              <a:rPr lang="en-US" smtClean="0"/>
+              <a:rPr lang="en-US" dirty="0" smtClean="0"/>
               <a:t>&amp;[Page]</a:t>
             </a:r>
-            <a:endParaRPr lang="en-US"/>
+            <a:endParaRPr lang="en-US" dirty="0"/>
           </a:p>
         </p:txBody>
       </p:sp>
@@ -2752,7 +2752,7 @@
               <a:rPr lang="en-US" smtClean="0"/>
               <a:t>‹#›</a:t>
             </a:fld>
-            <a:endParaRPr lang="en-US"/>
+            <a:endParaRPr lang="en-US" dirty="0"/>
           </a:p>
         </p:txBody>
       </p:sp>
@@ -2953,10 +2953,10 @@
           <a:lstStyle/>
           <a:p>
             <a:r>
-              <a:rPr lang="en-US" smtClean="0"/>
+              <a:rPr lang="en-US" dirty="0" smtClean="0"/>
               <a:t>8/18/16</a:t>
             </a:r>
-            <a:endParaRPr lang="en-US"/>
+            <a:endParaRPr lang="en-US" dirty="0"/>
           </a:p>
         </p:txBody>
       </p:sp>
@@ -2976,10 +2976,10 @@
           <a:lstStyle/>
           <a:p>
             <a:r>
-              <a:rPr lang="en-US" smtClean="0"/>
+              <a:rPr lang="en-US" dirty="0" smtClean="0"/>
               <a:t>&amp;[Page]</a:t>
             </a:r>
-            <a:endParaRPr lang="en-US"/>
+            <a:endParaRPr lang="en-US" dirty="0"/>
           </a:p>
         </p:txBody>
       </p:sp>
@@ -3002,7 +3002,7 @@
               <a:rPr lang="en-US" smtClean="0"/>
               <a:t>‹#›</a:t>
             </a:fld>
-            <a:endParaRPr lang="en-US"/>
+            <a:endParaRPr lang="en-US" dirty="0"/>
           </a:p>
         </p:txBody>
       </p:sp>
@@ -3189,10 +3189,10 @@
           <a:lstStyle/>
           <a:p>
             <a:r>
-              <a:rPr lang="en-US" smtClean="0"/>
+              <a:rPr lang="en-US" dirty="0" smtClean="0"/>
               <a:t>8/18/16</a:t>
             </a:r>
-            <a:endParaRPr lang="en-US"/>
+            <a:endParaRPr lang="en-US" dirty="0"/>
           </a:p>
         </p:txBody>
       </p:sp>
@@ -3212,10 +3212,10 @@
           <a:lstStyle/>
           <a:p>
             <a:r>
-              <a:rPr lang="en-US" smtClean="0"/>
+              <a:rPr lang="en-US" dirty="0" smtClean="0"/>
               <a:t>&amp;[Page]</a:t>
             </a:r>
-            <a:endParaRPr lang="en-US"/>
+            <a:endParaRPr lang="en-US" dirty="0"/>
           </a:p>
         </p:txBody>
       </p:sp>
@@ -3238,7 +3238,7 @@
               <a:rPr lang="en-US" smtClean="0"/>
               <a:t>‹#›</a:t>
             </a:fld>
-            <a:endParaRPr lang="en-US"/>
+            <a:endParaRPr lang="en-US" dirty="0"/>
           </a:p>
         </p:txBody>
       </p:sp>
@@ -3560,10 +3560,10 @@
           <a:lstStyle/>
           <a:p>
             <a:r>
-              <a:rPr lang="en-US" smtClean="0"/>
+              <a:rPr lang="en-US" dirty="0" smtClean="0"/>
               <a:t>8/18/16</a:t>
             </a:r>
-            <a:endParaRPr lang="en-US"/>
+            <a:endParaRPr lang="en-US" dirty="0"/>
           </a:p>
         </p:txBody>
       </p:sp>
@@ -3583,10 +3583,10 @@
           <a:lstStyle/>
           <a:p>
             <a:r>
-              <a:rPr lang="en-US" smtClean="0"/>
+              <a:rPr lang="en-US" dirty="0" smtClean="0"/>
               <a:t>&amp;[Page]</a:t>
             </a:r>
-            <a:endParaRPr lang="en-US"/>
+            <a:endParaRPr lang="en-US" dirty="0"/>
           </a:p>
         </p:txBody>
       </p:sp>
@@ -3609,7 +3609,7 @@
               <a:rPr lang="en-US" smtClean="0"/>
               <a:t>‹#›</a:t>
             </a:fld>
-            <a:endParaRPr lang="en-US"/>
+            <a:endParaRPr lang="en-US" dirty="0"/>
           </a:p>
         </p:txBody>
       </p:sp>
@@ -3682,10 +3682,10 @@
           <a:lstStyle/>
           <a:p>
             <a:r>
-              <a:rPr lang="en-US" smtClean="0"/>
+              <a:rPr lang="en-US" dirty="0" smtClean="0"/>
               <a:t>8/18/16</a:t>
             </a:r>
-            <a:endParaRPr lang="en-US"/>
+            <a:endParaRPr lang="en-US" dirty="0"/>
           </a:p>
         </p:txBody>
       </p:sp>
@@ -3705,10 +3705,10 @@
           <a:lstStyle/>
           <a:p>
             <a:r>
-              <a:rPr lang="en-US" smtClean="0"/>
+              <a:rPr lang="en-US" dirty="0" smtClean="0"/>
               <a:t>&amp;[Page]</a:t>
             </a:r>
-            <a:endParaRPr lang="en-US"/>
+            <a:endParaRPr lang="en-US" dirty="0"/>
           </a:p>
         </p:txBody>
       </p:sp>
@@ -3731,7 +3731,7 @@
               <a:rPr lang="en-US" smtClean="0"/>
               <a:t>‹#›</a:t>
             </a:fld>
-            <a:endParaRPr lang="en-US"/>
+            <a:endParaRPr lang="en-US" dirty="0"/>
           </a:p>
         </p:txBody>
       </p:sp>
@@ -3781,10 +3781,10 @@
           <a:lstStyle/>
           <a:p>
             <a:r>
-              <a:rPr lang="en-US" smtClean="0"/>
+              <a:rPr lang="en-US" dirty="0" smtClean="0"/>
               <a:t>8/18/16</a:t>
             </a:r>
-            <a:endParaRPr lang="en-US"/>
+            <a:endParaRPr lang="en-US" dirty="0"/>
           </a:p>
         </p:txBody>
       </p:sp>
@@ -3804,10 +3804,10 @@
           <a:lstStyle/>
           <a:p>
             <a:r>
-              <a:rPr lang="en-US" smtClean="0"/>
+              <a:rPr lang="en-US" dirty="0" smtClean="0"/>
               <a:t>&amp;[Page]</a:t>
             </a:r>
-            <a:endParaRPr lang="en-US"/>
+            <a:endParaRPr lang="en-US" dirty="0"/>
           </a:p>
         </p:txBody>
       </p:sp>
@@ -3830,7 +3830,7 @@
               <a:rPr lang="en-US" smtClean="0"/>
               <a:t>‹#›</a:t>
             </a:fld>
-            <a:endParaRPr lang="en-US"/>
+            <a:endParaRPr lang="en-US" dirty="0"/>
           </a:p>
         </p:txBody>
       </p:sp>
@@ -4062,10 +4062,10 @@
           <a:lstStyle/>
           <a:p>
             <a:r>
-              <a:rPr lang="en-US" smtClean="0"/>
+              <a:rPr lang="en-US" dirty="0" smtClean="0"/>
               <a:t>8/18/16</a:t>
             </a:r>
-            <a:endParaRPr lang="en-US"/>
+            <a:endParaRPr lang="en-US" dirty="0"/>
           </a:p>
         </p:txBody>
       </p:sp>
@@ -4085,10 +4085,10 @@
           <a:lstStyle/>
           <a:p>
             <a:r>
-              <a:rPr lang="en-US" smtClean="0"/>
+              <a:rPr lang="en-US" dirty="0" smtClean="0"/>
               <a:t>&amp;[Page]</a:t>
             </a:r>
-            <a:endParaRPr lang="en-US"/>
+            <a:endParaRPr lang="en-US" dirty="0"/>
           </a:p>
         </p:txBody>
       </p:sp>
@@ -4111,7 +4111,7 @@
               <a:rPr lang="en-US" smtClean="0"/>
               <a:t>‹#›</a:t>
             </a:fld>
-            <a:endParaRPr lang="en-US"/>
+            <a:endParaRPr lang="en-US" dirty="0"/>
           </a:p>
         </p:txBody>
       </p:sp>
@@ -4235,7 +4235,7 @@
           </a:lstStyle>
           <a:p>
             <a:r>
-              <a:rPr lang="en-US" smtClean="0"/>
+              <a:rPr lang="en-US" dirty="0" smtClean="0"/>
               <a:t>Drag picture to placeholder or click icon to add</a:t>
             </a:r>
             <a:endParaRPr lang="en-US" dirty="0"/>
@@ -4323,10 +4323,10 @@
           <a:lstStyle/>
           <a:p>
             <a:r>
-              <a:rPr lang="en-US" smtClean="0"/>
+              <a:rPr lang="en-US" dirty="0" smtClean="0"/>
               <a:t>8/18/16</a:t>
             </a:r>
-            <a:endParaRPr lang="en-US"/>
+            <a:endParaRPr lang="en-US" dirty="0"/>
           </a:p>
         </p:txBody>
       </p:sp>
@@ -4346,10 +4346,10 @@
           <a:lstStyle/>
           <a:p>
             <a:r>
-              <a:rPr lang="en-US" smtClean="0"/>
+              <a:rPr lang="en-US" dirty="0" smtClean="0"/>
               <a:t>&amp;[Page]</a:t>
             </a:r>
-            <a:endParaRPr lang="en-US"/>
+            <a:endParaRPr lang="en-US" dirty="0"/>
           </a:p>
         </p:txBody>
       </p:sp>
@@ -4372,7 +4372,7 @@
               <a:rPr lang="en-US" smtClean="0"/>
               <a:t>‹#›</a:t>
             </a:fld>
-            <a:endParaRPr lang="en-US"/>
+            <a:endParaRPr lang="en-US" dirty="0"/>
           </a:p>
         </p:txBody>
       </p:sp>
@@ -4540,10 +4540,10 @@
           </a:lstStyle>
           <a:p>
             <a:r>
-              <a:rPr lang="en-US" smtClean="0"/>
+              <a:rPr lang="en-US" dirty="0" smtClean="0"/>
               <a:t>8/18/16</a:t>
             </a:r>
-            <a:endParaRPr lang="en-US"/>
+            <a:endParaRPr lang="en-US" dirty="0"/>
           </a:p>
         </p:txBody>
       </p:sp>
@@ -4581,10 +4581,10 @@
           </a:lstStyle>
           <a:p>
             <a:r>
-              <a:rPr lang="en-US" smtClean="0"/>
+              <a:rPr lang="en-US" dirty="0" smtClean="0"/>
               <a:t>&amp;[Page]</a:t>
             </a:r>
-            <a:endParaRPr lang="en-US"/>
+            <a:endParaRPr lang="en-US" dirty="0"/>
           </a:p>
         </p:txBody>
       </p:sp>
@@ -4625,7 +4625,7 @@
               <a:rPr lang="en-US" smtClean="0"/>
               <a:t>‹#›</a:t>
             </a:fld>
-            <a:endParaRPr lang="en-US"/>
+            <a:endParaRPr lang="en-US" dirty="0"/>
           </a:p>
         </p:txBody>
       </p:sp>
@@ -5183,7 +5183,7 @@
           <a:lstStyle/>
           <a:p>
             <a:pPr algn="ctr"/>
-            <a:endParaRPr lang="en-US"/>
+            <a:endParaRPr lang="en-US" dirty="0"/>
           </a:p>
         </p:txBody>
       </p:sp>
@@ -5206,7 +5206,7 @@
               <a:rPr lang="en-US" smtClean="0"/>
               <a:t>1</a:t>
             </a:fld>
-            <a:endParaRPr lang="en-US"/>
+            <a:endParaRPr lang="en-US" dirty="0"/>
           </a:p>
         </p:txBody>
       </p:sp>
@@ -5226,10 +5226,10 @@
           <a:lstStyle/>
           <a:p>
             <a:r>
-              <a:rPr lang="en-US" smtClean="0"/>
+              <a:rPr lang="en-US" dirty="0" smtClean="0"/>
               <a:t>8/18/16</a:t>
             </a:r>
-            <a:endParaRPr lang="en-US"/>
+            <a:endParaRPr lang="en-US" dirty="0"/>
           </a:p>
         </p:txBody>
       </p:sp>
@@ -5302,7 +5302,7 @@
           <a:lstStyle/>
           <a:p>
             <a:pPr algn="ctr"/>
-            <a:endParaRPr lang="en-US"/>
+            <a:endParaRPr lang="en-US" dirty="0"/>
           </a:p>
         </p:txBody>
       </p:sp>
@@ -5438,7 +5438,7 @@
           <a:lstStyle/>
           <a:p>
             <a:pPr algn="ctr"/>
-            <a:endParaRPr lang="en-US"/>
+            <a:endParaRPr lang="en-US" dirty="0"/>
           </a:p>
         </p:txBody>
       </p:sp>
@@ -5547,10 +5547,10 @@
           <a:lstStyle/>
           <a:p>
             <a:r>
-              <a:rPr lang="en-US" smtClean="0"/>
+              <a:rPr lang="en-US" dirty="0" smtClean="0"/>
               <a:t>8/18/16</a:t>
             </a:r>
-            <a:endParaRPr lang="en-US"/>
+            <a:endParaRPr lang="en-US" dirty="0"/>
           </a:p>
         </p:txBody>
       </p:sp>
@@ -5573,7 +5573,7 @@
               <a:rPr lang="en-US" smtClean="0"/>
               <a:t>10</a:t>
             </a:fld>
-            <a:endParaRPr lang="en-US"/>
+            <a:endParaRPr lang="en-US" dirty="0"/>
           </a:p>
         </p:txBody>
       </p:sp>
@@ -5605,7 +5605,18 @@
                 <a:ea typeface="Futura Medium" charset="0"/>
                 <a:cs typeface="Futura Medium" charset="0"/>
               </a:rPr>
-              <a:t> Linear Regression</a:t>
+              <a:t> </a:t>
+            </a:r>
+            <a:r>
+              <a:rPr lang="en-US" sz="5000" dirty="0" smtClean="0">
+                <a:solidFill>
+                  <a:srgbClr val="002060"/>
+                </a:solidFill>
+                <a:latin typeface="Futura Medium" charset="0"/>
+                <a:ea typeface="Futura Medium" charset="0"/>
+                <a:cs typeface="Futura Medium" charset="0"/>
+              </a:rPr>
+              <a:t>Linear Regression</a:t>
             </a:r>
           </a:p>
         </p:txBody>
@@ -5698,7 +5709,7 @@
           <a:lstStyle/>
           <a:p>
             <a:pPr algn="ctr"/>
-            <a:endParaRPr lang="en-US"/>
+            <a:endParaRPr lang="en-US" dirty="0"/>
           </a:p>
         </p:txBody>
       </p:sp>
@@ -5807,10 +5818,10 @@
           <a:lstStyle/>
           <a:p>
             <a:r>
-              <a:rPr lang="en-US" smtClean="0"/>
+              <a:rPr lang="en-US" dirty="0" smtClean="0"/>
               <a:t>8/18/16</a:t>
             </a:r>
-            <a:endParaRPr lang="en-US"/>
+            <a:endParaRPr lang="en-US" dirty="0"/>
           </a:p>
         </p:txBody>
       </p:sp>
@@ -5833,7 +5844,7 @@
               <a:rPr lang="en-US" smtClean="0"/>
               <a:t>11</a:t>
             </a:fld>
-            <a:endParaRPr lang="en-US"/>
+            <a:endParaRPr lang="en-US" dirty="0"/>
           </a:p>
         </p:txBody>
       </p:sp>
@@ -5865,7 +5876,18 @@
                 <a:ea typeface="Futura Medium" charset="0"/>
                 <a:cs typeface="Futura Medium" charset="0"/>
               </a:rPr>
-              <a:t> Decision Tree</a:t>
+              <a:t> </a:t>
+            </a:r>
+            <a:r>
+              <a:rPr lang="en-US" sz="5000" dirty="0" smtClean="0">
+                <a:solidFill>
+                  <a:srgbClr val="002060"/>
+                </a:solidFill>
+                <a:latin typeface="Futura Medium" charset="0"/>
+                <a:ea typeface="Futura Medium" charset="0"/>
+                <a:cs typeface="Futura Medium" charset="0"/>
+              </a:rPr>
+              <a:t>Decision Tree</a:t>
             </a:r>
           </a:p>
         </p:txBody>
@@ -5958,7 +5980,7 @@
           <a:lstStyle/>
           <a:p>
             <a:pPr algn="ctr"/>
-            <a:endParaRPr lang="en-US"/>
+            <a:endParaRPr lang="en-US" dirty="0"/>
           </a:p>
         </p:txBody>
       </p:sp>
@@ -6067,10 +6089,10 @@
           <a:lstStyle/>
           <a:p>
             <a:r>
-              <a:rPr lang="en-US" smtClean="0"/>
+              <a:rPr lang="en-US" dirty="0" smtClean="0"/>
               <a:t>8/18/16</a:t>
             </a:r>
-            <a:endParaRPr lang="en-US"/>
+            <a:endParaRPr lang="en-US" dirty="0"/>
           </a:p>
         </p:txBody>
       </p:sp>
@@ -6093,7 +6115,7 @@
               <a:rPr lang="en-US" smtClean="0"/>
               <a:t>12</a:t>
             </a:fld>
-            <a:endParaRPr lang="en-US"/>
+            <a:endParaRPr lang="en-US" dirty="0"/>
           </a:p>
         </p:txBody>
       </p:sp>
@@ -6122,6 +6144,9 @@
             <a:pPr algn="ctr"/>
             <a:r>
               <a:rPr lang="en-US" sz="10000" dirty="0" smtClean="0">
+                <a:solidFill>
+                  <a:srgbClr val="002060"/>
+                </a:solidFill>
                 <a:latin typeface="Futura Medium" charset="0"/>
                 <a:ea typeface="Futura Medium" charset="0"/>
                 <a:cs typeface="Futura Medium" charset="0"/>
@@ -6129,6 +6154,9 @@
               <a:t>MAPS</a:t>
             </a:r>
             <a:endParaRPr lang="en-US" sz="10000" dirty="0">
+              <a:solidFill>
+                <a:srgbClr val="002060"/>
+              </a:solidFill>
               <a:latin typeface="Futura Medium" charset="0"/>
               <a:ea typeface="Futura Medium" charset="0"/>
               <a:cs typeface="Futura Medium" charset="0"/>
@@ -6224,7 +6252,7 @@
           <a:lstStyle/>
           <a:p>
             <a:pPr algn="ctr"/>
-            <a:endParaRPr lang="en-US"/>
+            <a:endParaRPr lang="en-US" dirty="0"/>
           </a:p>
         </p:txBody>
       </p:sp>
@@ -6333,10 +6361,10 @@
           <a:lstStyle/>
           <a:p>
             <a:r>
-              <a:rPr lang="en-US" smtClean="0"/>
+              <a:rPr lang="en-US" dirty="0" smtClean="0"/>
               <a:t>8/18/16</a:t>
             </a:r>
-            <a:endParaRPr lang="en-US"/>
+            <a:endParaRPr lang="en-US" dirty="0"/>
           </a:p>
         </p:txBody>
       </p:sp>
@@ -6359,7 +6387,7 @@
               <a:rPr lang="en-US" smtClean="0"/>
               <a:t>13</a:t>
             </a:fld>
-            <a:endParaRPr lang="en-US"/>
+            <a:endParaRPr lang="en-US" dirty="0"/>
           </a:p>
         </p:txBody>
       </p:sp>
@@ -6414,29 +6442,7 @@
                 <a:ea typeface="Futura Medium" charset="0"/>
                 <a:cs typeface="Futura Medium" charset="0"/>
               </a:rPr>
-              <a:t>Home Value Per </a:t>
-            </a:r>
-            <a:r>
-              <a:rPr lang="en-US" sz="3000" dirty="0" err="1" smtClean="0">
-                <a:solidFill>
-                  <a:srgbClr val="002060"/>
-                </a:solidFill>
-                <a:latin typeface="Futura Medium" charset="0"/>
-                <a:ea typeface="Futura Medium" charset="0"/>
-                <a:cs typeface="Futura Medium" charset="0"/>
-              </a:rPr>
-              <a:t>Sqft</a:t>
-            </a:r>
-            <a:r>
-              <a:rPr lang="en-US" sz="3000" dirty="0" smtClean="0">
-                <a:solidFill>
-                  <a:srgbClr val="002060"/>
-                </a:solidFill>
-                <a:latin typeface="Futura Medium" charset="0"/>
-                <a:ea typeface="Futura Medium" charset="0"/>
-                <a:cs typeface="Futura Medium" charset="0"/>
-              </a:rPr>
-              <a:t>.</a:t>
+              <a:t>Home Value Per Sqft.</a:t>
             </a:r>
             <a:endParaRPr lang="en-US" sz="3000" dirty="0">
               <a:solidFill>
@@ -6500,29 +6506,7 @@
                 <a:ea typeface="Futura Medium" charset="0"/>
                 <a:cs typeface="Futura Medium" charset="0"/>
               </a:rPr>
-              <a:t>Rental Price Per </a:t>
-            </a:r>
-            <a:r>
-              <a:rPr lang="en-US" sz="3000" dirty="0" err="1" smtClean="0">
-                <a:solidFill>
-                  <a:srgbClr val="002060"/>
-                </a:solidFill>
-                <a:latin typeface="Futura Medium" charset="0"/>
-                <a:ea typeface="Futura Medium" charset="0"/>
-                <a:cs typeface="Futura Medium" charset="0"/>
-              </a:rPr>
-              <a:t>Sqft</a:t>
-            </a:r>
-            <a:r>
-              <a:rPr lang="en-US" sz="3000" dirty="0" smtClean="0">
-                <a:solidFill>
-                  <a:srgbClr val="002060"/>
-                </a:solidFill>
-                <a:latin typeface="Futura Medium" charset="0"/>
-                <a:ea typeface="Futura Medium" charset="0"/>
-                <a:cs typeface="Futura Medium" charset="0"/>
-              </a:rPr>
-              <a:t>.</a:t>
+              <a:t>Rental Price Per Sqft.</a:t>
             </a:r>
             <a:endParaRPr lang="en-US" sz="3000" dirty="0">
               <a:solidFill>
@@ -6580,7 +6564,7 @@
           <a:lstStyle/>
           <a:p>
             <a:pPr algn="ctr"/>
-            <a:endParaRPr lang="en-US"/>
+            <a:endParaRPr lang="en-US" dirty="0"/>
           </a:p>
         </p:txBody>
       </p:sp>
@@ -6659,7 +6643,7 @@
           <a:lstStyle/>
           <a:p>
             <a:pPr algn="ctr"/>
-            <a:endParaRPr lang="en-US"/>
+            <a:endParaRPr lang="en-US" dirty="0"/>
           </a:p>
         </p:txBody>
       </p:sp>
@@ -6781,7 +6765,7 @@
           <a:lstStyle/>
           <a:p>
             <a:pPr algn="ctr"/>
-            <a:endParaRPr lang="en-US"/>
+            <a:endParaRPr lang="en-US" dirty="0"/>
           </a:p>
         </p:txBody>
       </p:sp>
@@ -6890,10 +6874,10 @@
           <a:lstStyle/>
           <a:p>
             <a:r>
-              <a:rPr lang="en-US" smtClean="0"/>
+              <a:rPr lang="en-US" dirty="0" smtClean="0"/>
               <a:t>8/18/16</a:t>
             </a:r>
-            <a:endParaRPr lang="en-US"/>
+            <a:endParaRPr lang="en-US" dirty="0"/>
           </a:p>
         </p:txBody>
       </p:sp>
@@ -6916,7 +6900,7 @@
               <a:rPr lang="en-US" smtClean="0"/>
               <a:t>2</a:t>
             </a:fld>
-            <a:endParaRPr lang="en-US"/>
+            <a:endParaRPr lang="en-US" dirty="0"/>
           </a:p>
         </p:txBody>
       </p:sp>
@@ -6945,6 +6929,9 @@
             <a:pPr algn="ctr"/>
             <a:r>
               <a:rPr lang="en-US" sz="10000" dirty="0" smtClean="0">
+                <a:solidFill>
+                  <a:srgbClr val="002060"/>
+                </a:solidFill>
                 <a:latin typeface="Futura Medium" charset="0"/>
                 <a:ea typeface="Futura Medium" charset="0"/>
                 <a:cs typeface="Futura Medium" charset="0"/>
@@ -6952,6 +6939,9 @@
               <a:t>BACKGROUND</a:t>
             </a:r>
             <a:endParaRPr lang="en-US" sz="10000" dirty="0">
+              <a:solidFill>
+                <a:srgbClr val="002060"/>
+              </a:solidFill>
               <a:latin typeface="Futura Medium" charset="0"/>
               <a:ea typeface="Futura Medium" charset="0"/>
               <a:cs typeface="Futura Medium" charset="0"/>
@@ -7047,7 +7037,7 @@
           <a:lstStyle/>
           <a:p>
             <a:pPr algn="ctr"/>
-            <a:endParaRPr lang="en-US"/>
+            <a:endParaRPr lang="en-US" dirty="0"/>
           </a:p>
         </p:txBody>
       </p:sp>
@@ -7156,10 +7146,10 @@
           <a:lstStyle/>
           <a:p>
             <a:r>
-              <a:rPr lang="en-US" smtClean="0"/>
+              <a:rPr lang="en-US" dirty="0" smtClean="0"/>
               <a:t>8/18/16</a:t>
             </a:r>
-            <a:endParaRPr lang="en-US"/>
+            <a:endParaRPr lang="en-US" dirty="0"/>
           </a:p>
         </p:txBody>
       </p:sp>
@@ -7182,7 +7172,7 @@
               <a:rPr lang="en-US" smtClean="0"/>
               <a:t>3</a:t>
             </a:fld>
-            <a:endParaRPr lang="en-US"/>
+            <a:endParaRPr lang="en-US" dirty="0"/>
           </a:p>
         </p:txBody>
       </p:sp>
@@ -7214,7 +7204,18 @@
                 <a:ea typeface="Futura Medium" charset="0"/>
                 <a:cs typeface="Futura Medium" charset="0"/>
               </a:rPr>
-              <a:t> Sources</a:t>
+              <a:t> </a:t>
+            </a:r>
+            <a:r>
+              <a:rPr lang="en-US" sz="5000" dirty="0" smtClean="0">
+                <a:solidFill>
+                  <a:srgbClr val="002060"/>
+                </a:solidFill>
+                <a:latin typeface="Futura Medium" charset="0"/>
+                <a:ea typeface="Futura Medium" charset="0"/>
+                <a:cs typeface="Futura Medium" charset="0"/>
+              </a:rPr>
+              <a:t>Sources</a:t>
             </a:r>
           </a:p>
         </p:txBody>
@@ -7227,7 +7228,7 @@
         </p:nvSpPr>
         <p:spPr>
           <a:xfrm>
-            <a:off x="0" y="1342310"/>
+            <a:off x="0" y="1499322"/>
             <a:ext cx="12192000" cy="553998"/>
           </a:xfrm>
           <a:prstGeom prst="rect">
@@ -7244,6 +7245,9 @@
             <a:pPr lvl="1"/>
             <a:r>
               <a:rPr lang="en-US" sz="3000" dirty="0" smtClean="0">
+                <a:solidFill>
+                  <a:srgbClr val="002060"/>
+                </a:solidFill>
                 <a:latin typeface="Futura Medium" charset="0"/>
                 <a:ea typeface="Futura Medium" charset="0"/>
                 <a:cs typeface="Futura Medium" charset="0"/>
@@ -7253,6 +7257,218 @@
           </a:p>
         </p:txBody>
       </p:sp>
+      <p:sp>
+        <p:nvSpPr>
+          <p:cNvPr id="15" name="TextBox 14"/>
+          <p:cNvSpPr txBox="1"/>
+          <p:nvPr/>
+        </p:nvSpPr>
+        <p:spPr>
+          <a:xfrm>
+            <a:off x="304798" y="2435232"/>
+            <a:ext cx="11582401" cy="3785652"/>
+          </a:xfrm>
+          <a:prstGeom prst="rect">
+            <a:avLst/>
+          </a:prstGeom>
+          <a:noFill/>
+        </p:spPr>
+        <p:txBody>
+          <a:bodyPr wrap="square" rtlCol="0">
+            <a:spAutoFit/>
+          </a:bodyPr>
+          <a:lstStyle/>
+          <a:p>
+            <a:pPr marL="800100" lvl="1" indent="-342900">
+              <a:buFont typeface="Arial" charset="0"/>
+              <a:buChar char="•"/>
+            </a:pPr>
+            <a:r>
+              <a:rPr lang="en-US" sz="2400" dirty="0" smtClean="0">
+                <a:solidFill>
+                  <a:srgbClr val="002060"/>
+                </a:solidFill>
+                <a:latin typeface="Futura Medium" charset="0"/>
+                <a:ea typeface="Futura Medium" charset="0"/>
+                <a:cs typeface="Futura Medium" charset="0"/>
+              </a:rPr>
+              <a:t>“The </a:t>
+            </a:r>
+            <a:r>
+              <a:rPr lang="en-US" sz="2400" dirty="0">
+                <a:solidFill>
+                  <a:srgbClr val="002060"/>
+                </a:solidFill>
+                <a:latin typeface="Futura Medium" charset="0"/>
+                <a:ea typeface="Futura Medium" charset="0"/>
+                <a:cs typeface="Futura Medium" charset="0"/>
+              </a:rPr>
+              <a:t>goal of HCI is to enhance public health by providing data, a standardized set of </a:t>
+            </a:r>
+            <a:r>
+              <a:rPr lang="en-US" sz="2400" b="1" dirty="0">
+                <a:solidFill>
+                  <a:srgbClr val="002060"/>
+                </a:solidFill>
+                <a:latin typeface="Futura Medium" charset="0"/>
+                <a:ea typeface="Futura Medium" charset="0"/>
+                <a:cs typeface="Futura Medium" charset="0"/>
+              </a:rPr>
+              <a:t> </a:t>
+            </a:r>
+            <a:r>
+              <a:rPr lang="en-US" sz="2400" dirty="0">
+                <a:solidFill>
+                  <a:srgbClr val="002060"/>
+                </a:solidFill>
+                <a:latin typeface="Futura Medium" charset="0"/>
+                <a:ea typeface="Futura Medium" charset="0"/>
+                <a:cs typeface="Futura Medium" charset="0"/>
+              </a:rPr>
+              <a:t>statistical measures, and tools that a broad array of sectors can use for planning healthy communities and evaluating the impact of plans, projects, policy, and environmental changes on community health</a:t>
+            </a:r>
+            <a:r>
+              <a:rPr lang="en-US" sz="2400" dirty="0" smtClean="0">
+                <a:solidFill>
+                  <a:srgbClr val="002060"/>
+                </a:solidFill>
+                <a:latin typeface="Futura Medium" charset="0"/>
+                <a:ea typeface="Futura Medium" charset="0"/>
+                <a:cs typeface="Futura Medium" charset="0"/>
+              </a:rPr>
+              <a:t>.”</a:t>
+            </a:r>
+          </a:p>
+          <a:p>
+            <a:pPr marL="800100" lvl="1" indent="-342900">
+              <a:buFont typeface="Arial" charset="0"/>
+              <a:buChar char="•"/>
+            </a:pPr>
+            <a:endParaRPr lang="en-US" sz="2400" dirty="0" smtClean="0">
+              <a:solidFill>
+                <a:srgbClr val="002060"/>
+              </a:solidFill>
+              <a:latin typeface="Futura Medium" charset="0"/>
+              <a:ea typeface="Futura Medium" charset="0"/>
+              <a:cs typeface="Futura Medium" charset="0"/>
+            </a:endParaRPr>
+          </a:p>
+          <a:p>
+            <a:pPr marL="800100" lvl="1" indent="-342900">
+              <a:buFont typeface="Arial" charset="0"/>
+              <a:buChar char="•"/>
+            </a:pPr>
+            <a:r>
+              <a:rPr lang="en-US" sz="2400" dirty="0" smtClean="0">
+                <a:solidFill>
+                  <a:srgbClr val="002060"/>
+                </a:solidFill>
+                <a:latin typeface="Futura Medium" charset="0"/>
+                <a:ea typeface="Futura Medium" charset="0"/>
+                <a:cs typeface="Futura Medium" charset="0"/>
+              </a:rPr>
+              <a:t>E.g. Poverty/Unemployment </a:t>
+            </a:r>
+            <a:r>
+              <a:rPr lang="en-US" sz="2400" dirty="0">
+                <a:solidFill>
+                  <a:srgbClr val="002060"/>
+                </a:solidFill>
+                <a:latin typeface="Futura Medium" charset="0"/>
+                <a:ea typeface="Futura Medium" charset="0"/>
+                <a:cs typeface="Futura Medium" charset="0"/>
+              </a:rPr>
+              <a:t>R</a:t>
+            </a:r>
+            <a:r>
+              <a:rPr lang="en-US" sz="2400" dirty="0" smtClean="0">
+                <a:solidFill>
+                  <a:srgbClr val="002060"/>
+                </a:solidFill>
+                <a:latin typeface="Futura Medium" charset="0"/>
+                <a:ea typeface="Futura Medium" charset="0"/>
+                <a:cs typeface="Futura Medium" charset="0"/>
+              </a:rPr>
+              <a:t>ates, Access to Parks/Public Transit</a:t>
+            </a:r>
+          </a:p>
+          <a:p>
+            <a:pPr marL="800100" lvl="1" indent="-342900">
+              <a:buFont typeface="Arial" charset="0"/>
+              <a:buChar char="•"/>
+            </a:pPr>
+            <a:endParaRPr lang="en-US" sz="2400" dirty="0">
+              <a:solidFill>
+                <a:srgbClr val="002060"/>
+              </a:solidFill>
+              <a:latin typeface="Futura Medium" charset="0"/>
+              <a:ea typeface="Futura Medium" charset="0"/>
+              <a:cs typeface="Futura Medium" charset="0"/>
+            </a:endParaRPr>
+          </a:p>
+          <a:p>
+            <a:pPr marL="800100" lvl="1" indent="-342900">
+              <a:buFont typeface="Arial" charset="0"/>
+              <a:buChar char="•"/>
+            </a:pPr>
+            <a:r>
+              <a:rPr lang="en-US" sz="2400" dirty="0" smtClean="0">
+                <a:solidFill>
+                  <a:srgbClr val="002060"/>
+                </a:solidFill>
+                <a:latin typeface="Futura Medium" charset="0"/>
+                <a:ea typeface="Futura Medium" charset="0"/>
+                <a:cs typeface="Futura Medium" charset="0"/>
+              </a:rPr>
+              <a:t>Data for most cities/towns in California at different levels of geographic specificity</a:t>
+            </a:r>
+          </a:p>
+          <a:p>
+            <a:pPr marL="800100" lvl="1" indent="-342900">
+              <a:buFont typeface="Arial" charset="0"/>
+              <a:buChar char="•"/>
+            </a:pPr>
+            <a:endParaRPr lang="en-US" sz="2400" dirty="0" smtClean="0">
+              <a:solidFill>
+                <a:srgbClr val="002060"/>
+              </a:solidFill>
+              <a:latin typeface="Futura Medium" charset="0"/>
+              <a:ea typeface="Futura Medium" charset="0"/>
+              <a:cs typeface="Futura Medium" charset="0"/>
+            </a:endParaRPr>
+          </a:p>
+        </p:txBody>
+      </p:sp>
+      <p:pic>
+        <p:nvPicPr>
+          <p:cNvPr id="4" name="Picture 3"/>
+          <p:cNvPicPr>
+            <a:picLocks noChangeAspect="1"/>
+          </p:cNvPicPr>
+          <p:nvPr/>
+        </p:nvPicPr>
+        <p:blipFill>
+          <a:blip r:embed="rId3">
+            <a:extLst>
+              <a:ext uri="{28A0092B-C50C-407E-A947-70E740481C1C}">
+                <a14:useLocalDpi xmlns:a14="http://schemas.microsoft.com/office/drawing/2010/main" val="0"/>
+              </a:ext>
+            </a:extLst>
+          </a:blip>
+          <a:stretch>
+            <a:fillRect/>
+          </a:stretch>
+        </p:blipFill>
+        <p:spPr>
+          <a:xfrm>
+            <a:off x="8305800" y="454357"/>
+            <a:ext cx="3886200" cy="869419"/>
+          </a:xfrm>
+          <a:prstGeom prst="rect">
+            <a:avLst/>
+          </a:prstGeom>
+        </p:spPr>
+      </p:pic>
     </p:spTree>
     <p:extLst>
       <p:ext uri="{BB962C8B-B14F-4D97-AF65-F5344CB8AC3E}">
@@ -7341,7 +7557,7 @@
           <a:lstStyle/>
           <a:p>
             <a:pPr algn="ctr"/>
-            <a:endParaRPr lang="en-US"/>
+            <a:endParaRPr lang="en-US" dirty="0"/>
           </a:p>
         </p:txBody>
       </p:sp>
@@ -7450,10 +7666,10 @@
           <a:lstStyle/>
           <a:p>
             <a:r>
-              <a:rPr lang="en-US" smtClean="0"/>
+              <a:rPr lang="en-US" dirty="0" smtClean="0"/>
               <a:t>8/18/16</a:t>
             </a:r>
-            <a:endParaRPr lang="en-US"/>
+            <a:endParaRPr lang="en-US" dirty="0"/>
           </a:p>
         </p:txBody>
       </p:sp>
@@ -7476,7 +7692,7 @@
               <a:rPr lang="en-US" smtClean="0"/>
               <a:t>4</a:t>
             </a:fld>
-            <a:endParaRPr lang="en-US"/>
+            <a:endParaRPr lang="en-US" dirty="0"/>
           </a:p>
         </p:txBody>
       </p:sp>
@@ -7508,15 +7724,231 @@
                 <a:ea typeface="Futura Medium" charset="0"/>
                 <a:cs typeface="Futura Medium" charset="0"/>
               </a:rPr>
-              <a:t> Data Dictionary</a:t>
-            </a:r>
-          </a:p>
-        </p:txBody>
-      </p:sp>
+              <a:t> </a:t>
+            </a:r>
+            <a:r>
+              <a:rPr lang="en-US" sz="5000" dirty="0" smtClean="0">
+                <a:solidFill>
+                  <a:srgbClr val="002060"/>
+                </a:solidFill>
+                <a:latin typeface="Futura Medium" charset="0"/>
+                <a:ea typeface="Futura Medium" charset="0"/>
+                <a:cs typeface="Futura Medium" charset="0"/>
+              </a:rPr>
+              <a:t>Sources</a:t>
+            </a:r>
+          </a:p>
+        </p:txBody>
+      </p:sp>
+      <p:sp>
+        <p:nvSpPr>
+          <p:cNvPr id="14" name="TextBox 13"/>
+          <p:cNvSpPr txBox="1"/>
+          <p:nvPr/>
+        </p:nvSpPr>
+        <p:spPr>
+          <a:xfrm>
+            <a:off x="0" y="1499322"/>
+            <a:ext cx="12192000" cy="553998"/>
+          </a:xfrm>
+          <a:prstGeom prst="rect">
+            <a:avLst/>
+          </a:prstGeom>
+          <a:noFill/>
+        </p:spPr>
+        <p:txBody>
+          <a:bodyPr wrap="square" rtlCol="0">
+            <a:spAutoFit/>
+          </a:bodyPr>
+          <a:lstStyle/>
+          <a:p>
+            <a:pPr lvl="1"/>
+            <a:r>
+              <a:rPr lang="en-US" sz="3000" dirty="0" smtClean="0">
+                <a:solidFill>
+                  <a:srgbClr val="002060"/>
+                </a:solidFill>
+                <a:latin typeface="Futura Medium" charset="0"/>
+                <a:ea typeface="Futura Medium" charset="0"/>
+                <a:cs typeface="Futura Medium" charset="0"/>
+              </a:rPr>
+              <a:t>Zillow Data</a:t>
+            </a:r>
+          </a:p>
+        </p:txBody>
+      </p:sp>
+      <p:sp>
+        <p:nvSpPr>
+          <p:cNvPr id="15" name="TextBox 14"/>
+          <p:cNvSpPr txBox="1"/>
+          <p:nvPr/>
+        </p:nvSpPr>
+        <p:spPr>
+          <a:xfrm>
+            <a:off x="304798" y="2435232"/>
+            <a:ext cx="11582401" cy="3785652"/>
+          </a:xfrm>
+          <a:prstGeom prst="rect">
+            <a:avLst/>
+          </a:prstGeom>
+          <a:noFill/>
+        </p:spPr>
+        <p:txBody>
+          <a:bodyPr wrap="square" rtlCol="0">
+            <a:spAutoFit/>
+          </a:bodyPr>
+          <a:lstStyle/>
+          <a:p>
+            <a:pPr marL="800100" lvl="1" indent="-342900">
+              <a:buFont typeface="Arial" charset="0"/>
+              <a:buChar char="•"/>
+            </a:pPr>
+            <a:r>
+              <a:rPr lang="en-US" sz="2400" dirty="0" smtClean="0">
+                <a:solidFill>
+                  <a:srgbClr val="002060"/>
+                </a:solidFill>
+                <a:latin typeface="Futura Medium" charset="0"/>
+                <a:ea typeface="Futura Medium" charset="0"/>
+                <a:cs typeface="Futura Medium" charset="0"/>
+              </a:rPr>
+              <a:t>“</a:t>
+            </a:r>
+            <a:r>
+              <a:rPr lang="en-US" sz="2400" dirty="0">
+                <a:solidFill>
+                  <a:srgbClr val="002060"/>
+                </a:solidFill>
+                <a:latin typeface="Futura Medium" charset="0"/>
+                <a:ea typeface="Futura Medium" charset="0"/>
+                <a:cs typeface="Futura Medium" charset="0"/>
+              </a:rPr>
+              <a:t>Zillow is the leading real estate and rental marketplace dedicated to empowering consumers with data, inspiration and knowledge around the place they call home, and connecting them with the best local professionals who can help</a:t>
+            </a:r>
+            <a:r>
+              <a:rPr lang="en-US" sz="2400" dirty="0" smtClean="0">
+                <a:solidFill>
+                  <a:srgbClr val="002060"/>
+                </a:solidFill>
+                <a:latin typeface="Futura Medium" charset="0"/>
+                <a:ea typeface="Futura Medium" charset="0"/>
+                <a:cs typeface="Futura Medium" charset="0"/>
+              </a:rPr>
+              <a:t>.”</a:t>
+            </a:r>
+          </a:p>
+          <a:p>
+            <a:pPr marL="800100" lvl="1" indent="-342900">
+              <a:buFont typeface="Arial" charset="0"/>
+              <a:buChar char="•"/>
+            </a:pPr>
+            <a:endParaRPr lang="en-US" sz="2400" dirty="0" smtClean="0">
+              <a:solidFill>
+                <a:srgbClr val="002060"/>
+              </a:solidFill>
+              <a:latin typeface="Futura Medium" charset="0"/>
+              <a:ea typeface="Futura Medium" charset="0"/>
+              <a:cs typeface="Futura Medium" charset="0"/>
+            </a:endParaRPr>
+          </a:p>
+          <a:p>
+            <a:pPr marL="800100" lvl="1" indent="-342900">
+              <a:buFont typeface="Arial" charset="0"/>
+              <a:buChar char="•"/>
+            </a:pPr>
+            <a:r>
+              <a:rPr lang="en-US" sz="2400" dirty="0" smtClean="0">
+                <a:solidFill>
+                  <a:srgbClr val="002060"/>
+                </a:solidFill>
+                <a:latin typeface="Futura Medium" charset="0"/>
+                <a:ea typeface="Futura Medium" charset="0"/>
+                <a:cs typeface="Futura Medium" charset="0"/>
+              </a:rPr>
+              <a:t>Provides time series data for a wide variety of real estate value and rental price metrics</a:t>
+            </a:r>
+          </a:p>
+          <a:p>
+            <a:pPr marL="800100" lvl="1" indent="-342900">
+              <a:buFont typeface="Arial" charset="0"/>
+              <a:buChar char="•"/>
+            </a:pPr>
+            <a:endParaRPr lang="en-US" sz="2400" dirty="0">
+              <a:solidFill>
+                <a:srgbClr val="002060"/>
+              </a:solidFill>
+              <a:latin typeface="Futura Medium" charset="0"/>
+              <a:ea typeface="Futura Medium" charset="0"/>
+              <a:cs typeface="Futura Medium" charset="0"/>
+            </a:endParaRPr>
+          </a:p>
+          <a:p>
+            <a:pPr marL="800100" lvl="1" indent="-342900">
+              <a:buFont typeface="Arial" charset="0"/>
+              <a:buChar char="•"/>
+            </a:pPr>
+            <a:r>
+              <a:rPr lang="en-US" sz="2400" dirty="0" smtClean="0">
+                <a:solidFill>
+                  <a:srgbClr val="002060"/>
+                </a:solidFill>
+                <a:latin typeface="Futura Medium" charset="0"/>
+                <a:ea typeface="Futura Medium" charset="0"/>
+                <a:cs typeface="Futura Medium" charset="0"/>
+              </a:rPr>
+              <a:t>Nationwide data at different levels of geographic specificity</a:t>
+            </a:r>
+          </a:p>
+          <a:p>
+            <a:pPr marL="800100" lvl="1" indent="-342900">
+              <a:buFont typeface="Arial" charset="0"/>
+              <a:buChar char="•"/>
+            </a:pPr>
+            <a:endParaRPr lang="en-US" sz="2400" dirty="0" smtClean="0">
+              <a:solidFill>
+                <a:srgbClr val="002060"/>
+              </a:solidFill>
+              <a:latin typeface="Futura Medium" charset="0"/>
+              <a:ea typeface="Futura Medium" charset="0"/>
+              <a:cs typeface="Futura Medium" charset="0"/>
+            </a:endParaRPr>
+          </a:p>
+        </p:txBody>
+      </p:sp>
+      <p:pic>
+        <p:nvPicPr>
+          <p:cNvPr id="3" name="Picture 2"/>
+          <p:cNvPicPr>
+            <a:picLocks noChangeAspect="1"/>
+          </p:cNvPicPr>
+          <p:nvPr/>
+        </p:nvPicPr>
+        <p:blipFill>
+          <a:blip r:embed="rId3">
+            <a:extLst>
+              <a:ext uri="{28A0092B-C50C-407E-A947-70E740481C1C}">
+                <a14:useLocalDpi xmlns:a14="http://schemas.microsoft.com/office/drawing/2010/main" val="0"/>
+              </a:ext>
+            </a:extLst>
+          </a:blip>
+          <a:stretch>
+            <a:fillRect/>
+          </a:stretch>
+        </p:blipFill>
+        <p:spPr>
+          <a:xfrm>
+            <a:off x="10477500" y="541866"/>
+            <a:ext cx="1257300" cy="1270000"/>
+          </a:xfrm>
+          <a:prstGeom prst="rect">
+            <a:avLst/>
+          </a:prstGeom>
+        </p:spPr>
+      </p:pic>
     </p:spTree>
     <p:extLst>
       <p:ext uri="{BB962C8B-B14F-4D97-AF65-F5344CB8AC3E}">
-        <p14:creationId xmlns:p14="http://schemas.microsoft.com/office/powerpoint/2010/main" val="1252451504"/>
+        <p14:creationId xmlns:p14="http://schemas.microsoft.com/office/powerpoint/2010/main" val="344778788"/>
       </p:ext>
     </p:extLst>
   </p:cSld>
@@ -7601,7 +8033,7 @@
           <a:lstStyle/>
           <a:p>
             <a:pPr algn="ctr"/>
-            <a:endParaRPr lang="en-US"/>
+            <a:endParaRPr lang="en-US" dirty="0"/>
           </a:p>
         </p:txBody>
       </p:sp>
@@ -7710,10 +8142,10 @@
           <a:lstStyle/>
           <a:p>
             <a:r>
-              <a:rPr lang="en-US" smtClean="0"/>
+              <a:rPr lang="en-US" dirty="0" smtClean="0"/>
               <a:t>8/18/16</a:t>
             </a:r>
-            <a:endParaRPr lang="en-US"/>
+            <a:endParaRPr lang="en-US" dirty="0"/>
           </a:p>
         </p:txBody>
       </p:sp>
@@ -7736,7 +8168,7 @@
               <a:rPr lang="en-US" smtClean="0"/>
               <a:t>5</a:t>
             </a:fld>
-            <a:endParaRPr lang="en-US"/>
+            <a:endParaRPr lang="en-US" dirty="0"/>
           </a:p>
         </p:txBody>
       </p:sp>
@@ -7768,7 +8200,18 @@
                 <a:ea typeface="Futura Medium" charset="0"/>
                 <a:cs typeface="Futura Medium" charset="0"/>
               </a:rPr>
-              <a:t> Goals</a:t>
+              <a:t> </a:t>
+            </a:r>
+            <a:r>
+              <a:rPr lang="en-US" sz="5000" dirty="0" smtClean="0">
+                <a:solidFill>
+                  <a:srgbClr val="002060"/>
+                </a:solidFill>
+                <a:latin typeface="Futura Medium" charset="0"/>
+                <a:ea typeface="Futura Medium" charset="0"/>
+                <a:cs typeface="Futura Medium" charset="0"/>
+              </a:rPr>
+              <a:t>Goals</a:t>
             </a:r>
           </a:p>
         </p:txBody>
@@ -7861,7 +8304,7 @@
           <a:lstStyle/>
           <a:p>
             <a:pPr algn="ctr"/>
-            <a:endParaRPr lang="en-US"/>
+            <a:endParaRPr lang="en-US" dirty="0"/>
           </a:p>
         </p:txBody>
       </p:sp>
@@ -7970,10 +8413,10 @@
           <a:lstStyle/>
           <a:p>
             <a:r>
-              <a:rPr lang="en-US" smtClean="0"/>
+              <a:rPr lang="en-US" dirty="0" smtClean="0"/>
               <a:t>8/18/16</a:t>
             </a:r>
-            <a:endParaRPr lang="en-US"/>
+            <a:endParaRPr lang="en-US" dirty="0"/>
           </a:p>
         </p:txBody>
       </p:sp>
@@ -7996,7 +8439,7 @@
               <a:rPr lang="en-US" smtClean="0"/>
               <a:t>6</a:t>
             </a:fld>
-            <a:endParaRPr lang="en-US"/>
+            <a:endParaRPr lang="en-US" dirty="0"/>
           </a:p>
         </p:txBody>
       </p:sp>
@@ -8028,7 +8471,18 @@
                 <a:ea typeface="Futura Medium" charset="0"/>
                 <a:cs typeface="Futura Medium" charset="0"/>
               </a:rPr>
-              <a:t> Cleaning</a:t>
+              <a:t> </a:t>
+            </a:r>
+            <a:r>
+              <a:rPr lang="en-US" sz="5000" dirty="0" smtClean="0">
+                <a:solidFill>
+                  <a:srgbClr val="002060"/>
+                </a:solidFill>
+                <a:latin typeface="Futura Medium" charset="0"/>
+                <a:ea typeface="Futura Medium" charset="0"/>
+                <a:cs typeface="Futura Medium" charset="0"/>
+              </a:rPr>
+              <a:t>Cleaning</a:t>
             </a:r>
           </a:p>
         </p:txBody>
@@ -8121,7 +8575,7 @@
           <a:lstStyle/>
           <a:p>
             <a:pPr algn="ctr"/>
-            <a:endParaRPr lang="en-US"/>
+            <a:endParaRPr lang="en-US" dirty="0"/>
           </a:p>
         </p:txBody>
       </p:sp>
@@ -8230,10 +8684,10 @@
           <a:lstStyle/>
           <a:p>
             <a:r>
-              <a:rPr lang="en-US" smtClean="0"/>
+              <a:rPr lang="en-US" dirty="0" smtClean="0"/>
               <a:t>8/18/16</a:t>
             </a:r>
-            <a:endParaRPr lang="en-US"/>
+            <a:endParaRPr lang="en-US" dirty="0"/>
           </a:p>
         </p:txBody>
       </p:sp>
@@ -8256,7 +8710,7 @@
               <a:rPr lang="en-US" smtClean="0"/>
               <a:t>7</a:t>
             </a:fld>
-            <a:endParaRPr lang="en-US"/>
+            <a:endParaRPr lang="en-US" dirty="0"/>
           </a:p>
         </p:txBody>
       </p:sp>
@@ -8288,11 +8742,46 @@
                 <a:ea typeface="Futura Medium" charset="0"/>
                 <a:cs typeface="Futura Medium" charset="0"/>
               </a:rPr>
-              <a:t> Data Dictionary</a:t>
-            </a:r>
-          </a:p>
-        </p:txBody>
-      </p:sp>
+              <a:t> </a:t>
+            </a:r>
+            <a:r>
+              <a:rPr lang="en-US" sz="5000" dirty="0" smtClean="0">
+                <a:solidFill>
+                  <a:srgbClr val="002060"/>
+                </a:solidFill>
+                <a:latin typeface="Futura Medium" charset="0"/>
+                <a:ea typeface="Futura Medium" charset="0"/>
+                <a:cs typeface="Futura Medium" charset="0"/>
+              </a:rPr>
+              <a:t>Data Dictionary</a:t>
+            </a:r>
+          </a:p>
+        </p:txBody>
+      </p:sp>
+      <p:pic>
+        <p:nvPicPr>
+          <p:cNvPr id="3" name="Picture 2"/>
+          <p:cNvPicPr>
+            <a:picLocks noChangeAspect="1"/>
+          </p:cNvPicPr>
+          <p:nvPr/>
+        </p:nvPicPr>
+        <p:blipFill>
+          <a:blip r:embed="rId3"/>
+          <a:stretch>
+            <a:fillRect/>
+          </a:stretch>
+        </p:blipFill>
+        <p:spPr>
+          <a:xfrm>
+            <a:off x="1931829" y="1499422"/>
+            <a:ext cx="8328341" cy="4662748"/>
+          </a:xfrm>
+          <a:prstGeom prst="rect">
+            <a:avLst/>
+          </a:prstGeom>
+        </p:spPr>
+      </p:pic>
     </p:spTree>
     <p:extLst>
       <p:ext uri="{BB962C8B-B14F-4D97-AF65-F5344CB8AC3E}">
@@ -8381,7 +8870,7 @@
           <a:lstStyle/>
           <a:p>
             <a:pPr algn="ctr"/>
-            <a:endParaRPr lang="en-US"/>
+            <a:endParaRPr lang="en-US" dirty="0"/>
           </a:p>
         </p:txBody>
       </p:sp>
@@ -8490,10 +8979,10 @@
           <a:lstStyle/>
           <a:p>
             <a:r>
-              <a:rPr lang="en-US" smtClean="0"/>
+              <a:rPr lang="en-US" dirty="0" smtClean="0"/>
               <a:t>8/18/16</a:t>
             </a:r>
-            <a:endParaRPr lang="en-US"/>
+            <a:endParaRPr lang="en-US" dirty="0"/>
           </a:p>
         </p:txBody>
       </p:sp>
@@ -8516,7 +9005,7 @@
               <a:rPr lang="en-US" smtClean="0"/>
               <a:t>8</a:t>
             </a:fld>
-            <a:endParaRPr lang="en-US"/>
+            <a:endParaRPr lang="en-US" dirty="0"/>
           </a:p>
         </p:txBody>
       </p:sp>
@@ -8545,6 +9034,9 @@
             <a:pPr algn="ctr"/>
             <a:r>
               <a:rPr lang="en-US" sz="10000" dirty="0" smtClean="0">
+                <a:solidFill>
+                  <a:srgbClr val="002060"/>
+                </a:solidFill>
                 <a:latin typeface="Futura Medium" charset="0"/>
                 <a:ea typeface="Futura Medium" charset="0"/>
                 <a:cs typeface="Futura Medium" charset="0"/>
@@ -8642,7 +9134,7 @@
           <a:lstStyle/>
           <a:p>
             <a:pPr algn="ctr"/>
-            <a:endParaRPr lang="en-US"/>
+            <a:endParaRPr lang="en-US" dirty="0"/>
           </a:p>
         </p:txBody>
       </p:sp>
@@ -8751,10 +9243,10 @@
           <a:lstStyle/>
           <a:p>
             <a:r>
-              <a:rPr lang="en-US" smtClean="0"/>
+              <a:rPr lang="en-US" dirty="0" smtClean="0"/>
               <a:t>8/18/16</a:t>
             </a:r>
-            <a:endParaRPr lang="en-US"/>
+            <a:endParaRPr lang="en-US" dirty="0"/>
           </a:p>
         </p:txBody>
       </p:sp>
@@ -8777,7 +9269,7 @@
               <a:rPr lang="en-US" smtClean="0"/>
               <a:t>9</a:t>
             </a:fld>
-            <a:endParaRPr lang="en-US"/>
+            <a:endParaRPr lang="en-US" dirty="0"/>
           </a:p>
         </p:txBody>
       </p:sp>
@@ -8809,7 +9301,18 @@
                 <a:ea typeface="Futura Medium" charset="0"/>
                 <a:cs typeface="Futura Medium" charset="0"/>
               </a:rPr>
-              <a:t> Lasso</a:t>
+              <a:t> </a:t>
+            </a:r>
+            <a:r>
+              <a:rPr lang="en-US" sz="5000" dirty="0" smtClean="0">
+                <a:solidFill>
+                  <a:srgbClr val="002060"/>
+                </a:solidFill>
+                <a:latin typeface="Futura Medium" charset="0"/>
+                <a:ea typeface="Futura Medium" charset="0"/>
+                <a:cs typeface="Futura Medium" charset="0"/>
+              </a:rPr>
+              <a:t>Lasso</a:t>
             </a:r>
           </a:p>
         </p:txBody>

</xml_diff>